<commit_message>
Update PowerPoint_Projet Panorama base de données.pptx
</commit_message>
<xml_diff>
--- a/PowerPoint_Projet Panorama base de données.pptx
+++ b/PowerPoint_Projet Panorama base de données.pptx
@@ -12,6 +12,13 @@
     <p:sldId id="261" r:id="rId6"/>
     <p:sldId id="262" r:id="rId7"/>
     <p:sldId id="263" r:id="rId8"/>
+    <p:sldId id="266" r:id="rId9"/>
+    <p:sldId id="267" r:id="rId10"/>
+    <p:sldId id="272" r:id="rId11"/>
+    <p:sldId id="268" r:id="rId12"/>
+    <p:sldId id="269" r:id="rId13"/>
+    <p:sldId id="270" r:id="rId14"/>
+    <p:sldId id="264" r:id="rId15"/>
   </p:sldIdLst>
   <p:sldSz cx="12192000" cy="6858000"/>
   <p:notesSz cx="6858000" cy="9144000"/>
@@ -118,6 +125,116 @@
 </p:presentation>
 </file>
 
+<file path=ppt/commentAuthors.xml><?xml version="1.0" encoding="utf-8"?>
+<p:cmAuthorLst xmlns:a="http://schemas.openxmlformats.org/drawingml/2006/main" xmlns:r="http://schemas.openxmlformats.org/officeDocument/2006/relationships" xmlns:p="http://schemas.openxmlformats.org/presentationml/2006/main">
+  <p:cmAuthor id="1" name="Sofiane AIT KADDOUR" initials="SAK" lastIdx="1" clrIdx="0">
+    <p:extLst>
+      <p:ext uri="{19B8F6BF-5375-455C-9EA6-DF929625EA0E}">
+        <p15:presenceInfo xmlns:p15="http://schemas.microsoft.com/office/powerpoint/2012/main" userId="S::saitkaddour@myges.fr::151ade7b-f72c-4df1-83b4-78f24222de3d" providerId="AD"/>
+      </p:ext>
+    </p:extLst>
+  </p:cmAuthor>
+</p:cmAuthorLst>
+</file>
+
+<file path=ppt/comments/comment1.xml><?xml version="1.0" encoding="utf-8"?>
+<p:cmLst xmlns:a="http://schemas.openxmlformats.org/drawingml/2006/main" xmlns:r="http://schemas.openxmlformats.org/officeDocument/2006/relationships" xmlns:p="http://schemas.openxmlformats.org/presentationml/2006/main">
+  <p:cm authorId="1" dt="2020-11-11T18:30:36.575" idx="1">
+    <p:pos x="10" y="10"/>
+    <p:text/>
+    <p:extLst>
+      <p:ext uri="{C676402C-5697-4E1C-873F-D02D1690AC5C}">
+        <p15:threadingInfo xmlns:p15="http://schemas.microsoft.com/office/powerpoint/2012/main" timeZoneBias="-60"/>
+      </p:ext>
+    </p:extLst>
+  </p:cm>
+</p:cmLst>
+</file>
+
+<file path=ppt/comments/comment2.xml><?xml version="1.0" encoding="utf-8"?>
+<p:cmLst xmlns:a="http://schemas.openxmlformats.org/drawingml/2006/main" xmlns:r="http://schemas.openxmlformats.org/officeDocument/2006/relationships" xmlns:p="http://schemas.openxmlformats.org/presentationml/2006/main">
+  <p:cm authorId="1" dt="2020-11-11T18:30:36.575" idx="1">
+    <p:pos x="10" y="10"/>
+    <p:text/>
+    <p:extLst>
+      <p:ext uri="{C676402C-5697-4E1C-873F-D02D1690AC5C}">
+        <p15:threadingInfo xmlns:p15="http://schemas.microsoft.com/office/powerpoint/2012/main" timeZoneBias="-60"/>
+      </p:ext>
+    </p:extLst>
+  </p:cm>
+</p:cmLst>
+</file>
+
+<file path=ppt/comments/comment3.xml><?xml version="1.0" encoding="utf-8"?>
+<p:cmLst xmlns:a="http://schemas.openxmlformats.org/drawingml/2006/main" xmlns:r="http://schemas.openxmlformats.org/officeDocument/2006/relationships" xmlns:p="http://schemas.openxmlformats.org/presentationml/2006/main">
+  <p:cm authorId="1" dt="2020-11-11T18:30:36.575" idx="1">
+    <p:pos x="10" y="10"/>
+    <p:text/>
+    <p:extLst>
+      <p:ext uri="{C676402C-5697-4E1C-873F-D02D1690AC5C}">
+        <p15:threadingInfo xmlns:p15="http://schemas.microsoft.com/office/powerpoint/2012/main" timeZoneBias="-60"/>
+      </p:ext>
+    </p:extLst>
+  </p:cm>
+</p:cmLst>
+</file>
+
+<file path=ppt/comments/comment4.xml><?xml version="1.0" encoding="utf-8"?>
+<p:cmLst xmlns:a="http://schemas.openxmlformats.org/drawingml/2006/main" xmlns:r="http://schemas.openxmlformats.org/officeDocument/2006/relationships" xmlns:p="http://schemas.openxmlformats.org/presentationml/2006/main">
+  <p:cm authorId="1" dt="2020-11-11T18:30:36.575" idx="1">
+    <p:pos x="10" y="10"/>
+    <p:text/>
+    <p:extLst>
+      <p:ext uri="{C676402C-5697-4E1C-873F-D02D1690AC5C}">
+        <p15:threadingInfo xmlns:p15="http://schemas.microsoft.com/office/powerpoint/2012/main" timeZoneBias="-60"/>
+      </p:ext>
+    </p:extLst>
+  </p:cm>
+</p:cmLst>
+</file>
+
+<file path=ppt/comments/comment5.xml><?xml version="1.0" encoding="utf-8"?>
+<p:cmLst xmlns:a="http://schemas.openxmlformats.org/drawingml/2006/main" xmlns:r="http://schemas.openxmlformats.org/officeDocument/2006/relationships" xmlns:p="http://schemas.openxmlformats.org/presentationml/2006/main">
+  <p:cm authorId="1" dt="2020-11-11T18:30:36.575" idx="1">
+    <p:pos x="10" y="10"/>
+    <p:text/>
+    <p:extLst>
+      <p:ext uri="{C676402C-5697-4E1C-873F-D02D1690AC5C}">
+        <p15:threadingInfo xmlns:p15="http://schemas.microsoft.com/office/powerpoint/2012/main" timeZoneBias="-60"/>
+      </p:ext>
+    </p:extLst>
+  </p:cm>
+</p:cmLst>
+</file>
+
+<file path=ppt/comments/comment6.xml><?xml version="1.0" encoding="utf-8"?>
+<p:cmLst xmlns:a="http://schemas.openxmlformats.org/drawingml/2006/main" xmlns:r="http://schemas.openxmlformats.org/officeDocument/2006/relationships" xmlns:p="http://schemas.openxmlformats.org/presentationml/2006/main">
+  <p:cm authorId="1" dt="2020-11-11T18:30:36.575" idx="1">
+    <p:pos x="10" y="10"/>
+    <p:text/>
+    <p:extLst>
+      <p:ext uri="{C676402C-5697-4E1C-873F-D02D1690AC5C}">
+        <p15:threadingInfo xmlns:p15="http://schemas.microsoft.com/office/powerpoint/2012/main" timeZoneBias="-60"/>
+      </p:ext>
+    </p:extLst>
+  </p:cm>
+</p:cmLst>
+</file>
+
+<file path=ppt/comments/comment7.xml><?xml version="1.0" encoding="utf-8"?>
+<p:cmLst xmlns:a="http://schemas.openxmlformats.org/drawingml/2006/main" xmlns:r="http://schemas.openxmlformats.org/officeDocument/2006/relationships" xmlns:p="http://schemas.openxmlformats.org/presentationml/2006/main">
+  <p:cm authorId="1" dt="2020-11-11T18:30:36.575" idx="1">
+    <p:pos x="10" y="10"/>
+    <p:text/>
+    <p:extLst>
+      <p:ext uri="{C676402C-5697-4E1C-873F-D02D1690AC5C}">
+        <p15:threadingInfo xmlns:p15="http://schemas.microsoft.com/office/powerpoint/2012/main" timeZoneBias="-60"/>
+      </p:ext>
+    </p:extLst>
+  </p:cm>
+</p:cmLst>
+</file>
+
 <file path=ppt/slideLayouts/slideLayout1.xml><?xml version="1.0" encoding="utf-8"?>
 <p:sldLayout xmlns:a="http://schemas.openxmlformats.org/drawingml/2006/main" xmlns:r="http://schemas.openxmlformats.org/officeDocument/2006/relationships" xmlns:p="http://schemas.openxmlformats.org/presentationml/2006/main" type="title" preserve="1">
   <p:cSld name="Diapositive de titre">
@@ -265,7 +382,7 @@
           <a:p>
             <a:fld id="{B8A8FE2F-BD92-422F-8F0C-D10A5DDBD61E}" type="datetimeFigureOut">
               <a:rPr lang="fr-FR" smtClean="0"/>
-              <a:t>08/11/2020</a:t>
+              <a:t>11/11/2020</a:t>
             </a:fld>
             <a:endParaRPr lang="fr-FR"/>
           </a:p>
@@ -463,7 +580,7 @@
           <a:p>
             <a:fld id="{B8A8FE2F-BD92-422F-8F0C-D10A5DDBD61E}" type="datetimeFigureOut">
               <a:rPr lang="fr-FR" smtClean="0"/>
-              <a:t>08/11/2020</a:t>
+              <a:t>11/11/2020</a:t>
             </a:fld>
             <a:endParaRPr lang="fr-FR"/>
           </a:p>
@@ -671,7 +788,7 @@
           <a:p>
             <a:fld id="{B8A8FE2F-BD92-422F-8F0C-D10A5DDBD61E}" type="datetimeFigureOut">
               <a:rPr lang="fr-FR" smtClean="0"/>
-              <a:t>08/11/2020</a:t>
+              <a:t>11/11/2020</a:t>
             </a:fld>
             <a:endParaRPr lang="fr-FR"/>
           </a:p>
@@ -869,7 +986,7 @@
           <a:p>
             <a:fld id="{B8A8FE2F-BD92-422F-8F0C-D10A5DDBD61E}" type="datetimeFigureOut">
               <a:rPr lang="fr-FR" smtClean="0"/>
-              <a:t>08/11/2020</a:t>
+              <a:t>11/11/2020</a:t>
             </a:fld>
             <a:endParaRPr lang="fr-FR"/>
           </a:p>
@@ -1144,7 +1261,7 @@
           <a:p>
             <a:fld id="{B8A8FE2F-BD92-422F-8F0C-D10A5DDBD61E}" type="datetimeFigureOut">
               <a:rPr lang="fr-FR" smtClean="0"/>
-              <a:t>08/11/2020</a:t>
+              <a:t>11/11/2020</a:t>
             </a:fld>
             <a:endParaRPr lang="fr-FR"/>
           </a:p>
@@ -1409,7 +1526,7 @@
           <a:p>
             <a:fld id="{B8A8FE2F-BD92-422F-8F0C-D10A5DDBD61E}" type="datetimeFigureOut">
               <a:rPr lang="fr-FR" smtClean="0"/>
-              <a:t>08/11/2020</a:t>
+              <a:t>11/11/2020</a:t>
             </a:fld>
             <a:endParaRPr lang="fr-FR"/>
           </a:p>
@@ -1821,7 +1938,7 @@
           <a:p>
             <a:fld id="{B8A8FE2F-BD92-422F-8F0C-D10A5DDBD61E}" type="datetimeFigureOut">
               <a:rPr lang="fr-FR" smtClean="0"/>
-              <a:t>08/11/2020</a:t>
+              <a:t>11/11/2020</a:t>
             </a:fld>
             <a:endParaRPr lang="fr-FR"/>
           </a:p>
@@ -1962,7 +2079,7 @@
           <a:p>
             <a:fld id="{B8A8FE2F-BD92-422F-8F0C-D10A5DDBD61E}" type="datetimeFigureOut">
               <a:rPr lang="fr-FR" smtClean="0"/>
-              <a:t>08/11/2020</a:t>
+              <a:t>11/11/2020</a:t>
             </a:fld>
             <a:endParaRPr lang="fr-FR"/>
           </a:p>
@@ -2075,7 +2192,7 @@
           <a:p>
             <a:fld id="{B8A8FE2F-BD92-422F-8F0C-D10A5DDBD61E}" type="datetimeFigureOut">
               <a:rPr lang="fr-FR" smtClean="0"/>
-              <a:t>08/11/2020</a:t>
+              <a:t>11/11/2020</a:t>
             </a:fld>
             <a:endParaRPr lang="fr-FR"/>
           </a:p>
@@ -2386,7 +2503,7 @@
           <a:p>
             <a:fld id="{B8A8FE2F-BD92-422F-8F0C-D10A5DDBD61E}" type="datetimeFigureOut">
               <a:rPr lang="fr-FR" smtClean="0"/>
-              <a:t>08/11/2020</a:t>
+              <a:t>11/11/2020</a:t>
             </a:fld>
             <a:endParaRPr lang="fr-FR"/>
           </a:p>
@@ -2674,7 +2791,7 @@
           <a:p>
             <a:fld id="{B8A8FE2F-BD92-422F-8F0C-D10A5DDBD61E}" type="datetimeFigureOut">
               <a:rPr lang="fr-FR" smtClean="0"/>
-              <a:t>08/11/2020</a:t>
+              <a:t>11/11/2020</a:t>
             </a:fld>
             <a:endParaRPr lang="fr-FR"/>
           </a:p>
@@ -2915,7 +3032,7 @@
           <a:p>
             <a:fld id="{B8A8FE2F-BD92-422F-8F0C-D10A5DDBD61E}" type="datetimeFigureOut">
               <a:rPr lang="fr-FR" smtClean="0"/>
-              <a:t>08/11/2020</a:t>
+              <a:t>11/11/2020</a:t>
             </a:fld>
             <a:endParaRPr lang="fr-FR"/>
           </a:p>
@@ -3624,6 +3741,750 @@
 </p:sld>
 </file>
 
+<file path=ppt/slides/slide10.xml><?xml version="1.0" encoding="utf-8"?>
+<p:sld xmlns:a="http://schemas.openxmlformats.org/drawingml/2006/main" xmlns:r="http://schemas.openxmlformats.org/officeDocument/2006/relationships" xmlns:p="http://schemas.openxmlformats.org/presentationml/2006/main">
+  <p:cSld>
+    <p:spTree>
+      <p:nvGrpSpPr>
+        <p:cNvPr id="1" name=""/>
+        <p:cNvGrpSpPr/>
+        <p:nvPr/>
+      </p:nvGrpSpPr>
+      <p:grpSpPr>
+        <a:xfrm>
+          <a:off x="0" y="0"/>
+          <a:ext cx="0" cy="0"/>
+          <a:chOff x="0" y="0"/>
+          <a:chExt cx="0" cy="0"/>
+        </a:xfrm>
+      </p:grpSpPr>
+      <p:sp>
+        <p:nvSpPr>
+          <p:cNvPr id="2" name="Titre 1">
+            <a:extLst>
+              <a:ext uri="{FF2B5EF4-FFF2-40B4-BE49-F238E27FC236}">
+                <a16:creationId xmlns:a16="http://schemas.microsoft.com/office/drawing/2014/main" id="{CE92B7C5-9835-0B43-9C94-A3158E5FFB81}"/>
+              </a:ext>
+            </a:extLst>
+          </p:cNvPr>
+          <p:cNvSpPr>
+            <a:spLocks noGrp="1"/>
+          </p:cNvSpPr>
+          <p:nvPr>
+            <p:ph type="title"/>
+          </p:nvPr>
+        </p:nvSpPr>
+        <p:spPr/>
+        <p:txBody>
+          <a:bodyPr/>
+          <a:lstStyle/>
+          <a:p>
+            <a:r>
+              <a:rPr lang="fr-FR" dirty="0"/>
+              <a:t>                             Requêtes SQL</a:t>
+            </a:r>
+          </a:p>
+        </p:txBody>
+      </p:sp>
+      <p:sp>
+        <p:nvSpPr>
+          <p:cNvPr id="21" name="ZoneTexte 20">
+            <a:extLst>
+              <a:ext uri="{FF2B5EF4-FFF2-40B4-BE49-F238E27FC236}">
+                <a16:creationId xmlns:a16="http://schemas.microsoft.com/office/drawing/2014/main" id="{5AC68AE1-F932-DE47-95A8-1A61D61632B7}"/>
+              </a:ext>
+            </a:extLst>
+          </p:cNvPr>
+          <p:cNvSpPr txBox="1"/>
+          <p:nvPr/>
+        </p:nvSpPr>
+        <p:spPr>
+          <a:xfrm>
+            <a:off x="838200" y="2256541"/>
+            <a:ext cx="9813074" cy="1477328"/>
+          </a:xfrm>
+          <a:prstGeom prst="rect">
+            <a:avLst/>
+          </a:prstGeom>
+          <a:noFill/>
+        </p:spPr>
+        <p:txBody>
+          <a:bodyPr wrap="square" rtlCol="0">
+            <a:spAutoFit/>
+          </a:bodyPr>
+          <a:lstStyle/>
+          <a:p>
+            <a:r>
+              <a:rPr lang="fr-FR" dirty="0"/>
+              <a:t>Cette requête permet de savoir le prix maximum d’un livre</a:t>
+            </a:r>
+          </a:p>
+          <a:p>
+            <a:endParaRPr lang="fr-FR" dirty="0"/>
+          </a:p>
+          <a:p>
+            <a:endParaRPr lang="fr-FR" dirty="0"/>
+          </a:p>
+          <a:p>
+            <a:endParaRPr lang="fr-FR" dirty="0"/>
+          </a:p>
+          <a:p>
+            <a:r>
+              <a:rPr lang="fr-FR" dirty="0"/>
+              <a:t>SELECT MAX (prix) FROM Commande;</a:t>
+            </a:r>
+          </a:p>
+        </p:txBody>
+      </p:sp>
+      <p:pic>
+        <p:nvPicPr>
+          <p:cNvPr id="6" name="Espace réservé du contenu 5">
+            <a:extLst>
+              <a:ext uri="{FF2B5EF4-FFF2-40B4-BE49-F238E27FC236}">
+                <a16:creationId xmlns:a16="http://schemas.microsoft.com/office/drawing/2014/main" id="{2F294468-6BAF-AD45-8DAC-51E9DD0E3485}"/>
+              </a:ext>
+            </a:extLst>
+          </p:cNvPr>
+          <p:cNvPicPr>
+            <a:picLocks noGrp="1" noChangeAspect="1"/>
+          </p:cNvPicPr>
+          <p:nvPr>
+            <p:ph idx="1"/>
+          </p:nvPr>
+        </p:nvPicPr>
+        <p:blipFill>
+          <a:blip r:embed="rId2">
+            <a:extLst>
+              <a:ext uri="{28A0092B-C50C-407E-A947-70E740481C1C}">
+                <a14:useLocalDpi xmlns:a14="http://schemas.microsoft.com/office/drawing/2010/main" val="0"/>
+              </a:ext>
+            </a:extLst>
+          </a:blip>
+          <a:stretch>
+            <a:fillRect/>
+          </a:stretch>
+        </p:blipFill>
+        <p:spPr>
+          <a:xfrm>
+            <a:off x="838200" y="4591331"/>
+            <a:ext cx="10515600" cy="1380245"/>
+          </a:xfrm>
+        </p:spPr>
+      </p:pic>
+    </p:spTree>
+    <p:extLst>
+      <p:ext uri="{BB962C8B-B14F-4D97-AF65-F5344CB8AC3E}">
+        <p14:creationId xmlns:p14="http://schemas.microsoft.com/office/powerpoint/2010/main" val="1366147951"/>
+      </p:ext>
+    </p:extLst>
+  </p:cSld>
+  <p:clrMapOvr>
+    <a:masterClrMapping/>
+  </p:clrMapOvr>
+</p:sld>
+</file>
+
+<file path=ppt/slides/slide11.xml><?xml version="1.0" encoding="utf-8"?>
+<p:sld xmlns:a="http://schemas.openxmlformats.org/drawingml/2006/main" xmlns:r="http://schemas.openxmlformats.org/officeDocument/2006/relationships" xmlns:p="http://schemas.openxmlformats.org/presentationml/2006/main">
+  <p:cSld>
+    <p:spTree>
+      <p:nvGrpSpPr>
+        <p:cNvPr id="1" name=""/>
+        <p:cNvGrpSpPr/>
+        <p:nvPr/>
+      </p:nvGrpSpPr>
+      <p:grpSpPr>
+        <a:xfrm>
+          <a:off x="0" y="0"/>
+          <a:ext cx="0" cy="0"/>
+          <a:chOff x="0" y="0"/>
+          <a:chExt cx="0" cy="0"/>
+        </a:xfrm>
+      </p:grpSpPr>
+      <p:sp>
+        <p:nvSpPr>
+          <p:cNvPr id="2" name="Titre 1">
+            <a:extLst>
+              <a:ext uri="{FF2B5EF4-FFF2-40B4-BE49-F238E27FC236}">
+                <a16:creationId xmlns:a16="http://schemas.microsoft.com/office/drawing/2014/main" id="{CE92B7C5-9835-0B43-9C94-A3158E5FFB81}"/>
+              </a:ext>
+            </a:extLst>
+          </p:cNvPr>
+          <p:cNvSpPr>
+            <a:spLocks noGrp="1"/>
+          </p:cNvSpPr>
+          <p:nvPr>
+            <p:ph type="title"/>
+          </p:nvPr>
+        </p:nvSpPr>
+        <p:spPr/>
+        <p:txBody>
+          <a:bodyPr/>
+          <a:lstStyle/>
+          <a:p>
+            <a:r>
+              <a:rPr lang="fr-FR" dirty="0"/>
+              <a:t>                             Requêtes SQL</a:t>
+            </a:r>
+          </a:p>
+        </p:txBody>
+      </p:sp>
+      <p:sp>
+        <p:nvSpPr>
+          <p:cNvPr id="21" name="ZoneTexte 20">
+            <a:extLst>
+              <a:ext uri="{FF2B5EF4-FFF2-40B4-BE49-F238E27FC236}">
+                <a16:creationId xmlns:a16="http://schemas.microsoft.com/office/drawing/2014/main" id="{5AC68AE1-F932-DE47-95A8-1A61D61632B7}"/>
+              </a:ext>
+            </a:extLst>
+          </p:cNvPr>
+          <p:cNvSpPr txBox="1"/>
+          <p:nvPr/>
+        </p:nvSpPr>
+        <p:spPr>
+          <a:xfrm>
+            <a:off x="838200" y="2256541"/>
+            <a:ext cx="9813074" cy="1477328"/>
+          </a:xfrm>
+          <a:prstGeom prst="rect">
+            <a:avLst/>
+          </a:prstGeom>
+          <a:noFill/>
+        </p:spPr>
+        <p:txBody>
+          <a:bodyPr wrap="square" rtlCol="0">
+            <a:spAutoFit/>
+          </a:bodyPr>
+          <a:lstStyle/>
+          <a:p>
+            <a:r>
+              <a:rPr lang="fr-FR" dirty="0"/>
+              <a:t>Cette requête permet de savoir la moyenne des prix</a:t>
+            </a:r>
+          </a:p>
+          <a:p>
+            <a:endParaRPr lang="fr-FR" dirty="0"/>
+          </a:p>
+          <a:p>
+            <a:endParaRPr lang="fr-FR" dirty="0"/>
+          </a:p>
+          <a:p>
+            <a:endParaRPr lang="fr-FR" dirty="0"/>
+          </a:p>
+          <a:p>
+            <a:r>
+              <a:rPr lang="fr-FR" dirty="0"/>
+              <a:t>SELECT AVG (prix) FROM Commande;</a:t>
+            </a:r>
+          </a:p>
+        </p:txBody>
+      </p:sp>
+      <p:pic>
+        <p:nvPicPr>
+          <p:cNvPr id="10" name="Espace réservé du contenu 9">
+            <a:extLst>
+              <a:ext uri="{FF2B5EF4-FFF2-40B4-BE49-F238E27FC236}">
+                <a16:creationId xmlns:a16="http://schemas.microsoft.com/office/drawing/2014/main" id="{56937059-1041-7447-96A1-C2DF7AD3EEA6}"/>
+              </a:ext>
+            </a:extLst>
+          </p:cNvPr>
+          <p:cNvPicPr>
+            <a:picLocks noGrp="1" noChangeAspect="1"/>
+          </p:cNvPicPr>
+          <p:nvPr>
+            <p:ph idx="1"/>
+          </p:nvPr>
+        </p:nvPicPr>
+        <p:blipFill>
+          <a:blip r:embed="rId2">
+            <a:extLst>
+              <a:ext uri="{28A0092B-C50C-407E-A947-70E740481C1C}">
+                <a14:useLocalDpi xmlns:a14="http://schemas.microsoft.com/office/drawing/2010/main" val="0"/>
+              </a:ext>
+            </a:extLst>
+          </a:blip>
+          <a:stretch>
+            <a:fillRect/>
+          </a:stretch>
+        </p:blipFill>
+        <p:spPr>
+          <a:xfrm>
+            <a:off x="838200" y="4036000"/>
+            <a:ext cx="10515600" cy="1380245"/>
+          </a:xfrm>
+        </p:spPr>
+      </p:pic>
+    </p:spTree>
+    <p:extLst>
+      <p:ext uri="{BB962C8B-B14F-4D97-AF65-F5344CB8AC3E}">
+        <p14:creationId xmlns:p14="http://schemas.microsoft.com/office/powerpoint/2010/main" val="727785484"/>
+      </p:ext>
+    </p:extLst>
+  </p:cSld>
+  <p:clrMapOvr>
+    <a:masterClrMapping/>
+  </p:clrMapOvr>
+</p:sld>
+</file>
+
+<file path=ppt/slides/slide12.xml><?xml version="1.0" encoding="utf-8"?>
+<p:sld xmlns:a="http://schemas.openxmlformats.org/drawingml/2006/main" xmlns:r="http://schemas.openxmlformats.org/officeDocument/2006/relationships" xmlns:p="http://schemas.openxmlformats.org/presentationml/2006/main">
+  <p:cSld>
+    <p:spTree>
+      <p:nvGrpSpPr>
+        <p:cNvPr id="1" name=""/>
+        <p:cNvGrpSpPr/>
+        <p:nvPr/>
+      </p:nvGrpSpPr>
+      <p:grpSpPr>
+        <a:xfrm>
+          <a:off x="0" y="0"/>
+          <a:ext cx="0" cy="0"/>
+          <a:chOff x="0" y="0"/>
+          <a:chExt cx="0" cy="0"/>
+        </a:xfrm>
+      </p:grpSpPr>
+      <p:sp>
+        <p:nvSpPr>
+          <p:cNvPr id="2" name="Titre 1">
+            <a:extLst>
+              <a:ext uri="{FF2B5EF4-FFF2-40B4-BE49-F238E27FC236}">
+                <a16:creationId xmlns:a16="http://schemas.microsoft.com/office/drawing/2014/main" id="{CE92B7C5-9835-0B43-9C94-A3158E5FFB81}"/>
+              </a:ext>
+            </a:extLst>
+          </p:cNvPr>
+          <p:cNvSpPr>
+            <a:spLocks noGrp="1"/>
+          </p:cNvSpPr>
+          <p:nvPr>
+            <p:ph type="title"/>
+          </p:nvPr>
+        </p:nvSpPr>
+        <p:spPr/>
+        <p:txBody>
+          <a:bodyPr/>
+          <a:lstStyle/>
+          <a:p>
+            <a:r>
+              <a:rPr lang="fr-FR" dirty="0"/>
+              <a:t>                             Requêtes SQL</a:t>
+            </a:r>
+          </a:p>
+        </p:txBody>
+      </p:sp>
+      <p:sp>
+        <p:nvSpPr>
+          <p:cNvPr id="21" name="ZoneTexte 20">
+            <a:extLst>
+              <a:ext uri="{FF2B5EF4-FFF2-40B4-BE49-F238E27FC236}">
+                <a16:creationId xmlns:a16="http://schemas.microsoft.com/office/drawing/2014/main" id="{5AC68AE1-F932-DE47-95A8-1A61D61632B7}"/>
+              </a:ext>
+            </a:extLst>
+          </p:cNvPr>
+          <p:cNvSpPr txBox="1"/>
+          <p:nvPr/>
+        </p:nvSpPr>
+        <p:spPr>
+          <a:xfrm>
+            <a:off x="1317702" y="2256541"/>
+            <a:ext cx="9813074" cy="1477328"/>
+          </a:xfrm>
+          <a:prstGeom prst="rect">
+            <a:avLst/>
+          </a:prstGeom>
+          <a:noFill/>
+        </p:spPr>
+        <p:txBody>
+          <a:bodyPr wrap="square" rtlCol="0">
+            <a:spAutoFit/>
+          </a:bodyPr>
+          <a:lstStyle/>
+          <a:p>
+            <a:r>
+              <a:rPr lang="fr-FR" dirty="0"/>
+              <a:t>Cette requête permet de savoir pour chaque ouvrage la somme de réservation</a:t>
+            </a:r>
+          </a:p>
+          <a:p>
+            <a:endParaRPr lang="fr-FR" dirty="0"/>
+          </a:p>
+          <a:p>
+            <a:endParaRPr lang="fr-FR" dirty="0"/>
+          </a:p>
+          <a:p>
+            <a:r>
+              <a:rPr lang="fr-FR" dirty="0"/>
+              <a:t>SELECT Titre, SUM (</a:t>
+            </a:r>
+            <a:r>
+              <a:rPr lang="fr-FR" dirty="0" err="1"/>
+              <a:t>Status</a:t>
+            </a:r>
+            <a:r>
+              <a:rPr lang="fr-FR" dirty="0"/>
+              <a:t>) FROM Ouvrage O, Stock S WHERE </a:t>
+            </a:r>
+            <a:r>
+              <a:rPr lang="fr-FR" dirty="0" err="1"/>
+              <a:t>S.Id_Ouvrage</a:t>
+            </a:r>
+            <a:r>
+              <a:rPr lang="fr-FR" dirty="0"/>
+              <a:t> = </a:t>
+            </a:r>
+            <a:r>
+              <a:rPr lang="fr-FR" dirty="0" err="1"/>
+              <a:t>O.id</a:t>
+            </a:r>
+            <a:r>
+              <a:rPr lang="fr-FR" dirty="0"/>
+              <a:t> AND </a:t>
+            </a:r>
+            <a:r>
+              <a:rPr lang="fr-FR" dirty="0" err="1"/>
+              <a:t>Status</a:t>
+            </a:r>
+            <a:r>
+              <a:rPr lang="fr-FR" dirty="0"/>
+              <a:t> = ‘Réservé’ GROUP BY Titre;</a:t>
+            </a:r>
+          </a:p>
+        </p:txBody>
+      </p:sp>
+      <p:pic>
+        <p:nvPicPr>
+          <p:cNvPr id="6" name="Espace réservé du contenu 5">
+            <a:extLst>
+              <a:ext uri="{FF2B5EF4-FFF2-40B4-BE49-F238E27FC236}">
+                <a16:creationId xmlns:a16="http://schemas.microsoft.com/office/drawing/2014/main" id="{9CB2A3E3-06F0-DA41-9B1A-88489171B2D8}"/>
+              </a:ext>
+            </a:extLst>
+          </p:cNvPr>
+          <p:cNvPicPr>
+            <a:picLocks noGrp="1" noChangeAspect="1"/>
+          </p:cNvPicPr>
+          <p:nvPr>
+            <p:ph idx="1"/>
+          </p:nvPr>
+        </p:nvPicPr>
+        <p:blipFill>
+          <a:blip r:embed="rId2">
+            <a:extLst>
+              <a:ext uri="{28A0092B-C50C-407E-A947-70E740481C1C}">
+                <a14:useLocalDpi xmlns:a14="http://schemas.microsoft.com/office/drawing/2010/main" val="0"/>
+              </a:ext>
+            </a:extLst>
+          </a:blip>
+          <a:stretch>
+            <a:fillRect/>
+          </a:stretch>
+        </p:blipFill>
+        <p:spPr>
+          <a:xfrm>
+            <a:off x="1776452" y="4039219"/>
+            <a:ext cx="7747000" cy="1625600"/>
+          </a:xfrm>
+        </p:spPr>
+      </p:pic>
+    </p:spTree>
+    <p:extLst>
+      <p:ext uri="{BB962C8B-B14F-4D97-AF65-F5344CB8AC3E}">
+        <p14:creationId xmlns:p14="http://schemas.microsoft.com/office/powerpoint/2010/main" val="567908156"/>
+      </p:ext>
+    </p:extLst>
+  </p:cSld>
+  <p:clrMapOvr>
+    <a:masterClrMapping/>
+  </p:clrMapOvr>
+</p:sld>
+</file>
+
+<file path=ppt/slides/slide13.xml><?xml version="1.0" encoding="utf-8"?>
+<p:sld xmlns:a="http://schemas.openxmlformats.org/drawingml/2006/main" xmlns:r="http://schemas.openxmlformats.org/officeDocument/2006/relationships" xmlns:p="http://schemas.openxmlformats.org/presentationml/2006/main">
+  <p:cSld>
+    <p:spTree>
+      <p:nvGrpSpPr>
+        <p:cNvPr id="1" name=""/>
+        <p:cNvGrpSpPr/>
+        <p:nvPr/>
+      </p:nvGrpSpPr>
+      <p:grpSpPr>
+        <a:xfrm>
+          <a:off x="0" y="0"/>
+          <a:ext cx="0" cy="0"/>
+          <a:chOff x="0" y="0"/>
+          <a:chExt cx="0" cy="0"/>
+        </a:xfrm>
+      </p:grpSpPr>
+      <p:sp>
+        <p:nvSpPr>
+          <p:cNvPr id="2" name="Titre 1">
+            <a:extLst>
+              <a:ext uri="{FF2B5EF4-FFF2-40B4-BE49-F238E27FC236}">
+                <a16:creationId xmlns:a16="http://schemas.microsoft.com/office/drawing/2014/main" id="{CE92B7C5-9835-0B43-9C94-A3158E5FFB81}"/>
+              </a:ext>
+            </a:extLst>
+          </p:cNvPr>
+          <p:cNvSpPr>
+            <a:spLocks noGrp="1"/>
+          </p:cNvSpPr>
+          <p:nvPr>
+            <p:ph type="title"/>
+          </p:nvPr>
+        </p:nvSpPr>
+        <p:spPr/>
+        <p:txBody>
+          <a:bodyPr/>
+          <a:lstStyle/>
+          <a:p>
+            <a:r>
+              <a:rPr lang="fr-FR" dirty="0"/>
+              <a:t>                             Requêtes SQL</a:t>
+            </a:r>
+          </a:p>
+        </p:txBody>
+      </p:sp>
+      <p:sp>
+        <p:nvSpPr>
+          <p:cNvPr id="21" name="ZoneTexte 20">
+            <a:extLst>
+              <a:ext uri="{FF2B5EF4-FFF2-40B4-BE49-F238E27FC236}">
+                <a16:creationId xmlns:a16="http://schemas.microsoft.com/office/drawing/2014/main" id="{5AC68AE1-F932-DE47-95A8-1A61D61632B7}"/>
+              </a:ext>
+            </a:extLst>
+          </p:cNvPr>
+          <p:cNvSpPr txBox="1"/>
+          <p:nvPr/>
+        </p:nvSpPr>
+        <p:spPr>
+          <a:xfrm>
+            <a:off x="2064834" y="2446112"/>
+            <a:ext cx="9813074" cy="1477328"/>
+          </a:xfrm>
+          <a:prstGeom prst="rect">
+            <a:avLst/>
+          </a:prstGeom>
+          <a:noFill/>
+        </p:spPr>
+        <p:txBody>
+          <a:bodyPr wrap="square" rtlCol="0">
+            <a:spAutoFit/>
+          </a:bodyPr>
+          <a:lstStyle/>
+          <a:p>
+            <a:r>
+              <a:rPr lang="fr-FR" dirty="0"/>
+              <a:t>Cette requête permet de savoir la référence la plus petite d’un livre</a:t>
+            </a:r>
+          </a:p>
+          <a:p>
+            <a:endParaRPr lang="fr-FR" dirty="0"/>
+          </a:p>
+          <a:p>
+            <a:endParaRPr lang="fr-FR" dirty="0"/>
+          </a:p>
+          <a:p>
+            <a:endParaRPr lang="fr-FR" dirty="0"/>
+          </a:p>
+          <a:p>
+            <a:r>
+              <a:rPr lang="fr-FR" dirty="0"/>
+              <a:t>SELECT MIN(ISBN) FROM Ouvrage;</a:t>
+            </a:r>
+          </a:p>
+        </p:txBody>
+      </p:sp>
+      <p:pic>
+        <p:nvPicPr>
+          <p:cNvPr id="11" name="Espace réservé du contenu 10">
+            <a:extLst>
+              <a:ext uri="{FF2B5EF4-FFF2-40B4-BE49-F238E27FC236}">
+                <a16:creationId xmlns:a16="http://schemas.microsoft.com/office/drawing/2014/main" id="{7AF17B83-4801-6F4C-B66C-3DB0D44889BF}"/>
+              </a:ext>
+            </a:extLst>
+          </p:cNvPr>
+          <p:cNvPicPr>
+            <a:picLocks noGrp="1" noChangeAspect="1"/>
+          </p:cNvPicPr>
+          <p:nvPr>
+            <p:ph idx="1"/>
+          </p:nvPr>
+        </p:nvPicPr>
+        <p:blipFill>
+          <a:blip r:embed="rId2">
+            <a:extLst>
+              <a:ext uri="{28A0092B-C50C-407E-A947-70E740481C1C}">
+                <a14:useLocalDpi xmlns:a14="http://schemas.microsoft.com/office/drawing/2010/main" val="0"/>
+              </a:ext>
+            </a:extLst>
+          </a:blip>
+          <a:stretch>
+            <a:fillRect/>
+          </a:stretch>
+        </p:blipFill>
+        <p:spPr>
+          <a:xfrm>
+            <a:off x="1884876" y="4230382"/>
+            <a:ext cx="7747000" cy="1511300"/>
+          </a:xfrm>
+        </p:spPr>
+      </p:pic>
+    </p:spTree>
+    <p:extLst>
+      <p:ext uri="{BB962C8B-B14F-4D97-AF65-F5344CB8AC3E}">
+        <p14:creationId xmlns:p14="http://schemas.microsoft.com/office/powerpoint/2010/main" val="3864141467"/>
+      </p:ext>
+    </p:extLst>
+  </p:cSld>
+  <p:clrMapOvr>
+    <a:masterClrMapping/>
+  </p:clrMapOvr>
+</p:sld>
+</file>
+
+<file path=ppt/slides/slide14.xml><?xml version="1.0" encoding="utf-8"?>
+<p:sld xmlns:a="http://schemas.openxmlformats.org/drawingml/2006/main" xmlns:r="http://schemas.openxmlformats.org/officeDocument/2006/relationships" xmlns:p="http://schemas.openxmlformats.org/presentationml/2006/main">
+  <p:cSld>
+    <p:spTree>
+      <p:nvGrpSpPr>
+        <p:cNvPr id="1" name=""/>
+        <p:cNvGrpSpPr/>
+        <p:nvPr/>
+      </p:nvGrpSpPr>
+      <p:grpSpPr>
+        <a:xfrm>
+          <a:off x="0" y="0"/>
+          <a:ext cx="0" cy="0"/>
+          <a:chOff x="0" y="0"/>
+          <a:chExt cx="0" cy="0"/>
+        </a:xfrm>
+      </p:grpSpPr>
+      <p:sp>
+        <p:nvSpPr>
+          <p:cNvPr id="2" name="Titre 1">
+            <a:extLst>
+              <a:ext uri="{FF2B5EF4-FFF2-40B4-BE49-F238E27FC236}">
+                <a16:creationId xmlns:a16="http://schemas.microsoft.com/office/drawing/2014/main" id="{CE92B7C5-9835-0B43-9C94-A3158E5FFB81}"/>
+              </a:ext>
+            </a:extLst>
+          </p:cNvPr>
+          <p:cNvSpPr>
+            <a:spLocks noGrp="1"/>
+          </p:cNvSpPr>
+          <p:nvPr>
+            <p:ph type="title"/>
+          </p:nvPr>
+        </p:nvSpPr>
+        <p:spPr/>
+        <p:txBody>
+          <a:bodyPr/>
+          <a:lstStyle/>
+          <a:p>
+            <a:r>
+              <a:rPr lang="fr-FR" dirty="0"/>
+              <a:t>                             Requêtes SQL</a:t>
+            </a:r>
+          </a:p>
+        </p:txBody>
+      </p:sp>
+      <p:sp>
+        <p:nvSpPr>
+          <p:cNvPr id="21" name="ZoneTexte 20">
+            <a:extLst>
+              <a:ext uri="{FF2B5EF4-FFF2-40B4-BE49-F238E27FC236}">
+                <a16:creationId xmlns:a16="http://schemas.microsoft.com/office/drawing/2014/main" id="{5AC68AE1-F932-DE47-95A8-1A61D61632B7}"/>
+              </a:ext>
+            </a:extLst>
+          </p:cNvPr>
+          <p:cNvSpPr txBox="1"/>
+          <p:nvPr/>
+        </p:nvSpPr>
+        <p:spPr>
+          <a:xfrm>
+            <a:off x="838200" y="2256541"/>
+            <a:ext cx="9813074" cy="1477328"/>
+          </a:xfrm>
+          <a:prstGeom prst="rect">
+            <a:avLst/>
+          </a:prstGeom>
+          <a:noFill/>
+        </p:spPr>
+        <p:txBody>
+          <a:bodyPr wrap="square" rtlCol="0">
+            <a:spAutoFit/>
+          </a:bodyPr>
+          <a:lstStyle/>
+          <a:p>
+            <a:r>
+              <a:rPr lang="fr-FR" dirty="0"/>
+              <a:t>Cette requête permet de sélectionner le client avec l’id le plus grand</a:t>
+            </a:r>
+          </a:p>
+          <a:p>
+            <a:endParaRPr lang="fr-FR" dirty="0"/>
+          </a:p>
+          <a:p>
+            <a:endParaRPr lang="fr-FR" dirty="0"/>
+          </a:p>
+          <a:p>
+            <a:endParaRPr lang="fr-FR" dirty="0"/>
+          </a:p>
+          <a:p>
+            <a:r>
+              <a:rPr lang="fr-FR" dirty="0"/>
+              <a:t>SELECT MAX(id) FROM client;</a:t>
+            </a:r>
+          </a:p>
+        </p:txBody>
+      </p:sp>
+      <p:pic>
+        <p:nvPicPr>
+          <p:cNvPr id="25" name="Espace réservé du contenu 24">
+            <a:extLst>
+              <a:ext uri="{FF2B5EF4-FFF2-40B4-BE49-F238E27FC236}">
+                <a16:creationId xmlns:a16="http://schemas.microsoft.com/office/drawing/2014/main" id="{140DB007-B37E-1247-BC22-4F1DDFC23857}"/>
+              </a:ext>
+            </a:extLst>
+          </p:cNvPr>
+          <p:cNvPicPr>
+            <a:picLocks noGrp="1" noChangeAspect="1"/>
+          </p:cNvPicPr>
+          <p:nvPr>
+            <p:ph idx="1"/>
+          </p:nvPr>
+        </p:nvPicPr>
+        <p:blipFill>
+          <a:blip r:embed="rId2">
+            <a:extLst>
+              <a:ext uri="{28A0092B-C50C-407E-A947-70E740481C1C}">
+                <a14:useLocalDpi xmlns:a14="http://schemas.microsoft.com/office/drawing/2010/main" val="0"/>
+              </a:ext>
+            </a:extLst>
+          </a:blip>
+          <a:stretch>
+            <a:fillRect/>
+          </a:stretch>
+        </p:blipFill>
+        <p:spPr>
+          <a:xfrm>
+            <a:off x="838200" y="4337083"/>
+            <a:ext cx="10515600" cy="1380245"/>
+          </a:xfrm>
+        </p:spPr>
+      </p:pic>
+    </p:spTree>
+    <p:extLst>
+      <p:ext uri="{BB962C8B-B14F-4D97-AF65-F5344CB8AC3E}">
+        <p14:creationId xmlns:p14="http://schemas.microsoft.com/office/powerpoint/2010/main" val="2300263933"/>
+      </p:ext>
+    </p:extLst>
+  </p:cSld>
+  <p:clrMapOvr>
+    <a:masterClrMapping/>
+  </p:clrMapOvr>
+</p:sld>
+</file>
+
 <file path=ppt/slides/slide2.xml><?xml version="1.0" encoding="utf-8"?>
 <p:sld xmlns:a="http://schemas.openxmlformats.org/drawingml/2006/main" xmlns:r="http://schemas.openxmlformats.org/officeDocument/2006/relationships" xmlns:p="http://schemas.openxmlformats.org/presentationml/2006/main">
   <p:cSld>
@@ -5615,6 +6476,316 @@
     <p:extLst>
       <p:ext uri="{BB962C8B-B14F-4D97-AF65-F5344CB8AC3E}">
         <p14:creationId xmlns:p14="http://schemas.microsoft.com/office/powerpoint/2010/main" val="2419900714"/>
+      </p:ext>
+    </p:extLst>
+  </p:cSld>
+  <p:clrMapOvr>
+    <a:masterClrMapping/>
+  </p:clrMapOvr>
+</p:sld>
+</file>
+
+<file path=ppt/slides/slide8.xml><?xml version="1.0" encoding="utf-8"?>
+<p:sld xmlns:a="http://schemas.openxmlformats.org/drawingml/2006/main" xmlns:r="http://schemas.openxmlformats.org/officeDocument/2006/relationships" xmlns:p="http://schemas.openxmlformats.org/presentationml/2006/main">
+  <p:cSld>
+    <p:spTree>
+      <p:nvGrpSpPr>
+        <p:cNvPr id="1" name=""/>
+        <p:cNvGrpSpPr/>
+        <p:nvPr/>
+      </p:nvGrpSpPr>
+      <p:grpSpPr>
+        <a:xfrm>
+          <a:off x="0" y="0"/>
+          <a:ext cx="0" cy="0"/>
+          <a:chOff x="0" y="0"/>
+          <a:chExt cx="0" cy="0"/>
+        </a:xfrm>
+      </p:grpSpPr>
+      <p:sp>
+        <p:nvSpPr>
+          <p:cNvPr id="2" name="Titre 1">
+            <a:extLst>
+              <a:ext uri="{FF2B5EF4-FFF2-40B4-BE49-F238E27FC236}">
+                <a16:creationId xmlns:a16="http://schemas.microsoft.com/office/drawing/2014/main" id="{CE92B7C5-9835-0B43-9C94-A3158E5FFB81}"/>
+              </a:ext>
+            </a:extLst>
+          </p:cNvPr>
+          <p:cNvSpPr>
+            <a:spLocks noGrp="1"/>
+          </p:cNvSpPr>
+          <p:nvPr>
+            <p:ph type="title"/>
+          </p:nvPr>
+        </p:nvSpPr>
+        <p:spPr/>
+        <p:txBody>
+          <a:bodyPr/>
+          <a:lstStyle/>
+          <a:p>
+            <a:r>
+              <a:rPr lang="fr-FR" dirty="0"/>
+              <a:t>                             Requêtes SQL</a:t>
+            </a:r>
+          </a:p>
+        </p:txBody>
+      </p:sp>
+      <p:sp>
+        <p:nvSpPr>
+          <p:cNvPr id="21" name="ZoneTexte 20">
+            <a:extLst>
+              <a:ext uri="{FF2B5EF4-FFF2-40B4-BE49-F238E27FC236}">
+                <a16:creationId xmlns:a16="http://schemas.microsoft.com/office/drawing/2014/main" id="{5AC68AE1-F932-DE47-95A8-1A61D61632B7}"/>
+              </a:ext>
+            </a:extLst>
+          </p:cNvPr>
+          <p:cNvSpPr txBox="1"/>
+          <p:nvPr/>
+        </p:nvSpPr>
+        <p:spPr>
+          <a:xfrm>
+            <a:off x="838200" y="2256541"/>
+            <a:ext cx="9813074" cy="1477328"/>
+          </a:xfrm>
+          <a:prstGeom prst="rect">
+            <a:avLst/>
+          </a:prstGeom>
+          <a:noFill/>
+        </p:spPr>
+        <p:txBody>
+          <a:bodyPr wrap="square" rtlCol="0">
+            <a:spAutoFit/>
+          </a:bodyPr>
+          <a:lstStyle/>
+          <a:p>
+            <a:r>
+              <a:rPr lang="fr-FR" dirty="0"/>
+              <a:t>Cette requête permet de calculer la somme des prix de toutes les commandes</a:t>
+            </a:r>
+          </a:p>
+          <a:p>
+            <a:endParaRPr lang="fr-FR" dirty="0"/>
+          </a:p>
+          <a:p>
+            <a:endParaRPr lang="fr-FR" dirty="0"/>
+          </a:p>
+          <a:p>
+            <a:endParaRPr lang="fr-FR" dirty="0"/>
+          </a:p>
+          <a:p>
+            <a:r>
+              <a:rPr lang="fr-FR" dirty="0"/>
+              <a:t>SELECT SUM(prix) FROM Commande;</a:t>
+            </a:r>
+          </a:p>
+        </p:txBody>
+      </p:sp>
+      <p:pic>
+        <p:nvPicPr>
+          <p:cNvPr id="6" name="Espace réservé du contenu 5">
+            <a:extLst>
+              <a:ext uri="{FF2B5EF4-FFF2-40B4-BE49-F238E27FC236}">
+                <a16:creationId xmlns:a16="http://schemas.microsoft.com/office/drawing/2014/main" id="{8DD338DB-9E09-5D4D-9CE6-8C9D9CE5C0DA}"/>
+              </a:ext>
+            </a:extLst>
+          </p:cNvPr>
+          <p:cNvPicPr>
+            <a:picLocks noGrp="1" noChangeAspect="1"/>
+          </p:cNvPicPr>
+          <p:nvPr>
+            <p:ph idx="1"/>
+          </p:nvPr>
+        </p:nvPicPr>
+        <p:blipFill>
+          <a:blip r:embed="rId2">
+            <a:extLst>
+              <a:ext uri="{28A0092B-C50C-407E-A947-70E740481C1C}">
+                <a14:useLocalDpi xmlns:a14="http://schemas.microsoft.com/office/drawing/2010/main" val="0"/>
+              </a:ext>
+            </a:extLst>
+          </a:blip>
+          <a:stretch>
+            <a:fillRect/>
+          </a:stretch>
+        </p:blipFill>
+        <p:spPr>
+          <a:xfrm>
+            <a:off x="838200" y="4526654"/>
+            <a:ext cx="10515600" cy="1380245"/>
+          </a:xfrm>
+        </p:spPr>
+      </p:pic>
+    </p:spTree>
+    <p:extLst>
+      <p:ext uri="{BB962C8B-B14F-4D97-AF65-F5344CB8AC3E}">
+        <p14:creationId xmlns:p14="http://schemas.microsoft.com/office/powerpoint/2010/main" val="245016197"/>
+      </p:ext>
+    </p:extLst>
+  </p:cSld>
+  <p:clrMapOvr>
+    <a:masterClrMapping/>
+  </p:clrMapOvr>
+</p:sld>
+</file>
+
+<file path=ppt/slides/slide9.xml><?xml version="1.0" encoding="utf-8"?>
+<p:sld xmlns:a="http://schemas.openxmlformats.org/drawingml/2006/main" xmlns:r="http://schemas.openxmlformats.org/officeDocument/2006/relationships" xmlns:p="http://schemas.openxmlformats.org/presentationml/2006/main">
+  <p:cSld>
+    <p:spTree>
+      <p:nvGrpSpPr>
+        <p:cNvPr id="1" name=""/>
+        <p:cNvGrpSpPr/>
+        <p:nvPr/>
+      </p:nvGrpSpPr>
+      <p:grpSpPr>
+        <a:xfrm>
+          <a:off x="0" y="0"/>
+          <a:ext cx="0" cy="0"/>
+          <a:chOff x="0" y="0"/>
+          <a:chExt cx="0" cy="0"/>
+        </a:xfrm>
+      </p:grpSpPr>
+      <p:sp>
+        <p:nvSpPr>
+          <p:cNvPr id="2" name="Titre 1">
+            <a:extLst>
+              <a:ext uri="{FF2B5EF4-FFF2-40B4-BE49-F238E27FC236}">
+                <a16:creationId xmlns:a16="http://schemas.microsoft.com/office/drawing/2014/main" id="{CE92B7C5-9835-0B43-9C94-A3158E5FFB81}"/>
+              </a:ext>
+            </a:extLst>
+          </p:cNvPr>
+          <p:cNvSpPr>
+            <a:spLocks noGrp="1"/>
+          </p:cNvSpPr>
+          <p:nvPr>
+            <p:ph type="title"/>
+          </p:nvPr>
+        </p:nvSpPr>
+        <p:spPr/>
+        <p:txBody>
+          <a:bodyPr/>
+          <a:lstStyle/>
+          <a:p>
+            <a:r>
+              <a:rPr lang="fr-FR" dirty="0"/>
+              <a:t>                             Requêtes SQL</a:t>
+            </a:r>
+          </a:p>
+        </p:txBody>
+      </p:sp>
+      <p:pic>
+        <p:nvPicPr>
+          <p:cNvPr id="19" name="Espace réservé du contenu 18" descr="Une image contenant texte&#10;&#10;Description générée automatiquement">
+            <a:extLst>
+              <a:ext uri="{FF2B5EF4-FFF2-40B4-BE49-F238E27FC236}">
+                <a16:creationId xmlns:a16="http://schemas.microsoft.com/office/drawing/2014/main" id="{58711EC7-6578-764E-8FBC-EC532C3ADAD7}"/>
+              </a:ext>
+            </a:extLst>
+          </p:cNvPr>
+          <p:cNvPicPr>
+            <a:picLocks noGrp="1" noChangeAspect="1"/>
+          </p:cNvPicPr>
+          <p:nvPr>
+            <p:ph idx="1"/>
+          </p:nvPr>
+        </p:nvPicPr>
+        <p:blipFill>
+          <a:blip r:embed="rId2">
+            <a:extLst>
+              <a:ext uri="{28A0092B-C50C-407E-A947-70E740481C1C}">
+                <a14:useLocalDpi xmlns:a14="http://schemas.microsoft.com/office/drawing/2010/main" val="0"/>
+              </a:ext>
+            </a:extLst>
+          </a:blip>
+          <a:stretch>
+            <a:fillRect/>
+          </a:stretch>
+        </p:blipFill>
+        <p:spPr>
+          <a:xfrm>
+            <a:off x="838200" y="4576720"/>
+            <a:ext cx="10515600" cy="1684367"/>
+          </a:xfrm>
+        </p:spPr>
+      </p:pic>
+      <p:sp>
+        <p:nvSpPr>
+          <p:cNvPr id="21" name="ZoneTexte 20">
+            <a:extLst>
+              <a:ext uri="{FF2B5EF4-FFF2-40B4-BE49-F238E27FC236}">
+                <a16:creationId xmlns:a16="http://schemas.microsoft.com/office/drawing/2014/main" id="{5AC68AE1-F932-DE47-95A8-1A61D61632B7}"/>
+              </a:ext>
+            </a:extLst>
+          </p:cNvPr>
+          <p:cNvSpPr txBox="1"/>
+          <p:nvPr/>
+        </p:nvSpPr>
+        <p:spPr>
+          <a:xfrm>
+            <a:off x="838200" y="2256541"/>
+            <a:ext cx="9813074" cy="1754326"/>
+          </a:xfrm>
+          <a:prstGeom prst="rect">
+            <a:avLst/>
+          </a:prstGeom>
+          <a:noFill/>
+        </p:spPr>
+        <p:txBody>
+          <a:bodyPr wrap="square" rtlCol="0">
+            <a:spAutoFit/>
+          </a:bodyPr>
+          <a:lstStyle/>
+          <a:p>
+            <a:r>
+              <a:rPr lang="fr-FR" dirty="0"/>
+              <a:t>Cette requête permet de savoir le nombre de livre disponible pour chaque ouvrage</a:t>
+            </a:r>
+          </a:p>
+          <a:p>
+            <a:endParaRPr lang="fr-FR" dirty="0"/>
+          </a:p>
+          <a:p>
+            <a:endParaRPr lang="fr-FR" dirty="0"/>
+          </a:p>
+          <a:p>
+            <a:endParaRPr lang="fr-FR" dirty="0"/>
+          </a:p>
+          <a:p>
+            <a:r>
+              <a:rPr lang="fr-FR" dirty="0"/>
+              <a:t>SELECT Titre, COUNT(STATUS) FROM Ouvrage O, Stock S WHERE </a:t>
+            </a:r>
+            <a:r>
+              <a:rPr lang="fr-FR" dirty="0" err="1"/>
+              <a:t>S.Id_Ouvrage</a:t>
+            </a:r>
+            <a:r>
+              <a:rPr lang="fr-FR" dirty="0"/>
+              <a:t> = </a:t>
+            </a:r>
+            <a:r>
+              <a:rPr lang="fr-FR" dirty="0" err="1"/>
+              <a:t>O.id</a:t>
+            </a:r>
+            <a:r>
+              <a:rPr lang="fr-FR" dirty="0"/>
+              <a:t> AND </a:t>
+            </a:r>
+            <a:r>
+              <a:rPr lang="fr-FR" dirty="0" err="1"/>
+              <a:t>Status</a:t>
+            </a:r>
+            <a:r>
+              <a:rPr lang="fr-FR" dirty="0"/>
+              <a:t> = ’Libre’ GROUP BY Titre;</a:t>
+            </a:r>
+          </a:p>
+        </p:txBody>
+      </p:sp>
+    </p:spTree>
+    <p:extLst>
+      <p:ext uri="{BB962C8B-B14F-4D97-AF65-F5344CB8AC3E}">
+        <p14:creationId xmlns:p14="http://schemas.microsoft.com/office/powerpoint/2010/main" val="2114840266"/>
       </p:ext>
     </p:extLst>
   </p:cSld>

</xml_diff>